<commit_message>
He de continuar con las graficas de las curvas
</commit_message>
<xml_diff>
--- a/LabBook_10.pptx
+++ b/LabBook_10.pptx
@@ -5,10 +5,10 @@
     <p:sldMasterId id="2147483648" r:id="rId1"/>
   </p:sldMasterIdLst>
   <p:notesMasterIdLst>
-    <p:notesMasterId r:id="rId18"/>
+    <p:notesMasterId r:id="rId19"/>
   </p:notesMasterIdLst>
   <p:handoutMasterIdLst>
-    <p:handoutMasterId r:id="rId19"/>
+    <p:handoutMasterId r:id="rId20"/>
   </p:handoutMasterIdLst>
   <p:sldIdLst>
     <p:sldId id="256" r:id="rId2"/>
@@ -26,7 +26,8 @@
     <p:sldId id="305" r:id="rId14"/>
     <p:sldId id="306" r:id="rId15"/>
     <p:sldId id="293" r:id="rId16"/>
-    <p:sldId id="288" r:id="rId17"/>
+    <p:sldId id="307" r:id="rId17"/>
+    <p:sldId id="288" r:id="rId18"/>
   </p:sldIdLst>
   <p:sldSz cx="12192000" cy="6858000"/>
   <p:notesSz cx="12192000" cy="6858000"/>
@@ -1352,6 +1353,114 @@
     <p:extLst>
       <p:ext uri="{BB962C8B-B14F-4D97-AF65-F5344CB8AC3E}">
         <p14:creationId xmlns:p14="http://schemas.microsoft.com/office/powerpoint/2010/main" val="2917382716"/>
+      </p:ext>
+    </p:extLst>
+  </p:cSld>
+  <p:clrMapOvr>
+    <a:masterClrMapping/>
+  </p:clrMapOvr>
+</p:notes>
+</file>
+
+<file path=ppt/notesSlides/notesSlide14.xml><?xml version="1.0" encoding="utf-8"?>
+<p:notes xmlns:a="http://schemas.openxmlformats.org/drawingml/2006/main" xmlns:r="http://schemas.openxmlformats.org/officeDocument/2006/relationships" xmlns:p="http://schemas.openxmlformats.org/presentationml/2006/main">
+  <p:cSld>
+    <p:spTree>
+      <p:nvGrpSpPr>
+        <p:cNvPr id="1" name="">
+          <a:extLst>
+            <a:ext uri="{FF2B5EF4-FFF2-40B4-BE49-F238E27FC236}">
+              <a16:creationId xmlns:a16="http://schemas.microsoft.com/office/drawing/2014/main" id="{A7E46A55-A169-D715-4D64-24443AE3F082}"/>
+            </a:ext>
+          </a:extLst>
+        </p:cNvPr>
+        <p:cNvGrpSpPr/>
+        <p:nvPr/>
+      </p:nvGrpSpPr>
+      <p:grpSpPr>
+        <a:xfrm>
+          <a:off x="0" y="0"/>
+          <a:ext cx="0" cy="0"/>
+          <a:chOff x="0" y="0"/>
+          <a:chExt cx="0" cy="0"/>
+        </a:xfrm>
+      </p:grpSpPr>
+      <p:sp>
+        <p:nvSpPr>
+          <p:cNvPr id="2" name="Marcador de imagen de diapositiva 1">
+            <a:extLst>
+              <a:ext uri="{FF2B5EF4-FFF2-40B4-BE49-F238E27FC236}">
+                <a16:creationId xmlns:a16="http://schemas.microsoft.com/office/drawing/2014/main" id="{99187BC9-3CC4-180E-1C42-04C7D45203F1}"/>
+              </a:ext>
+            </a:extLst>
+          </p:cNvPr>
+          <p:cNvSpPr>
+            <a:spLocks noGrp="1" noRot="1" noChangeAspect="1"/>
+          </p:cNvSpPr>
+          <p:nvPr>
+            <p:ph type="sldImg"/>
+          </p:nvPr>
+        </p:nvSpPr>
+        <p:spPr/>
+      </p:sp>
+      <p:sp>
+        <p:nvSpPr>
+          <p:cNvPr id="3" name="Marcador de notas 2">
+            <a:extLst>
+              <a:ext uri="{FF2B5EF4-FFF2-40B4-BE49-F238E27FC236}">
+                <a16:creationId xmlns:a16="http://schemas.microsoft.com/office/drawing/2014/main" id="{16EC5B81-8D1B-B942-F0AC-A1BAB868734F}"/>
+              </a:ext>
+            </a:extLst>
+          </p:cNvPr>
+          <p:cNvSpPr>
+            <a:spLocks noGrp="1"/>
+          </p:cNvSpPr>
+          <p:nvPr>
+            <p:ph type="body" idx="1"/>
+          </p:nvPr>
+        </p:nvSpPr>
+        <p:spPr/>
+        <p:txBody>
+          <a:bodyPr/>
+          <a:lstStyle/>
+          <a:p>
+            <a:endParaRPr lang="es-ES" dirty="0"/>
+          </a:p>
+        </p:txBody>
+      </p:sp>
+      <p:sp>
+        <p:nvSpPr>
+          <p:cNvPr id="4" name="Marcador de número de diapositiva 3">
+            <a:extLst>
+              <a:ext uri="{FF2B5EF4-FFF2-40B4-BE49-F238E27FC236}">
+                <a16:creationId xmlns:a16="http://schemas.microsoft.com/office/drawing/2014/main" id="{9C59D3E0-3409-006A-CF25-28D3907279F1}"/>
+              </a:ext>
+            </a:extLst>
+          </p:cNvPr>
+          <p:cNvSpPr>
+            <a:spLocks noGrp="1"/>
+          </p:cNvSpPr>
+          <p:nvPr>
+            <p:ph type="sldNum" sz="quarter" idx="5"/>
+          </p:nvPr>
+        </p:nvSpPr>
+        <p:spPr/>
+        <p:txBody>
+          <a:bodyPr/>
+          <a:lstStyle/>
+          <a:p>
+            <a:fld id="{676223B9-C868-4436-87D9-1A3152E1157A}" type="slidenum">
+              <a:rPr lang="es-ES" smtClean="0"/>
+              <a:t>16</a:t>
+            </a:fld>
+            <a:endParaRPr lang="es-ES"/>
+          </a:p>
+        </p:txBody>
+      </p:sp>
+    </p:spTree>
+    <p:extLst>
+      <p:ext uri="{BB962C8B-B14F-4D97-AF65-F5344CB8AC3E}">
+        <p14:creationId xmlns:p14="http://schemas.microsoft.com/office/powerpoint/2010/main" val="658141471"/>
       </p:ext>
     </p:extLst>
   </p:cSld>
@@ -10340,6 +10449,585 @@
   <p:cSld>
     <p:spTree>
       <p:nvGrpSpPr>
+        <p:cNvPr id="1" name="">
+          <a:extLst>
+            <a:ext uri="{FF2B5EF4-FFF2-40B4-BE49-F238E27FC236}">
+              <a16:creationId xmlns:a16="http://schemas.microsoft.com/office/drawing/2014/main" id="{171F7D6D-2EBE-651B-2992-9CC80B91AAB8}"/>
+            </a:ext>
+          </a:extLst>
+        </p:cNvPr>
+        <p:cNvGrpSpPr/>
+        <p:nvPr/>
+      </p:nvGrpSpPr>
+      <p:grpSpPr>
+        <a:xfrm>
+          <a:off x="0" y="0"/>
+          <a:ext cx="0" cy="0"/>
+          <a:chOff x="0" y="0"/>
+          <a:chExt cx="0" cy="0"/>
+        </a:xfrm>
+      </p:grpSpPr>
+      <p:sp>
+        <p:nvSpPr>
+          <p:cNvPr id="16" name="object 16">
+            <a:extLst>
+              <a:ext uri="{FF2B5EF4-FFF2-40B4-BE49-F238E27FC236}">
+                <a16:creationId xmlns:a16="http://schemas.microsoft.com/office/drawing/2014/main" id="{F9360EC7-2A4C-370F-AFFD-6EC982E756D7}"/>
+              </a:ext>
+            </a:extLst>
+          </p:cNvPr>
+          <p:cNvSpPr txBox="1">
+            <a:spLocks noGrp="1"/>
+          </p:cNvSpPr>
+          <p:nvPr>
+            <p:ph type="title"/>
+          </p:nvPr>
+        </p:nvSpPr>
+        <p:spPr>
+          <a:xfrm>
+            <a:off x="685800" y="408883"/>
+            <a:ext cx="10994410" cy="1090042"/>
+          </a:xfrm>
+          <a:prstGeom prst="rect">
+            <a:avLst/>
+          </a:prstGeom>
+        </p:spPr>
+        <p:txBody>
+          <a:bodyPr vert="horz" wrap="square" lIns="0" tIns="12700" rIns="0" bIns="0" rtlCol="0">
+            <a:spAutoFit/>
+          </a:bodyPr>
+          <a:lstStyle/>
+          <a:p>
+            <a:pPr marL="12700">
+              <a:lnSpc>
+                <a:spcPct val="100000"/>
+              </a:lnSpc>
+              <a:spcBef>
+                <a:spcPts val="100"/>
+              </a:spcBef>
+            </a:pPr>
+            <a:r>
+              <a:rPr lang="en-US" sz="2500" dirty="0"/>
+              <a:t>Learning outcome #4 – Bend waveguide radius vs. loss – deep TE0</a:t>
+            </a:r>
+            <a:br>
+              <a:rPr lang="en-US" sz="2500" dirty="0"/>
+            </a:br>
+            <a:r>
+              <a:rPr lang="en-US" b="0" dirty="0"/>
+              <a:t>Find  neff_TE0 for </a:t>
+            </a:r>
+            <a:r>
+              <a:rPr lang="en-US" b="0" dirty="0" err="1"/>
+              <a:t>wvl</a:t>
+            </a:r>
+            <a:r>
+              <a:rPr lang="en-US" b="0" dirty="0"/>
+              <a:t> 1.55 µm, width 1.0 µm for R=25,50,75,100, 125,150 µm</a:t>
+            </a:r>
+            <a:br>
+              <a:rPr lang="en-US" sz="2500" dirty="0"/>
+            </a:br>
+            <a:endParaRPr lang="en-US" sz="2500" b="0" dirty="0">
+              <a:latin typeface="+mj-lt"/>
+              <a:cs typeface="Lucida Sans"/>
+            </a:endParaRPr>
+          </a:p>
+        </p:txBody>
+      </p:sp>
+      <p:pic>
+        <p:nvPicPr>
+          <p:cNvPr id="83" name="Gráfico 82">
+            <a:extLst>
+              <a:ext uri="{FF2B5EF4-FFF2-40B4-BE49-F238E27FC236}">
+                <a16:creationId xmlns:a16="http://schemas.microsoft.com/office/drawing/2014/main" id="{60AEE972-BE8E-0B11-C490-37B31ECF76C4}"/>
+              </a:ext>
+            </a:extLst>
+          </p:cNvPr>
+          <p:cNvPicPr>
+            <a:picLocks noChangeAspect="1"/>
+          </p:cNvPicPr>
+          <p:nvPr/>
+        </p:nvPicPr>
+        <p:blipFill>
+          <a:blip r:embed="rId3">
+            <a:extLst>
+              <a:ext uri="{96DAC541-7B7A-43D3-8B79-37D633B846F1}">
+                <asvg:svgBlip xmlns:asvg="http://schemas.microsoft.com/office/drawing/2016/SVG/main" r:embed="rId4"/>
+              </a:ext>
+            </a:extLst>
+          </a:blip>
+          <a:stretch>
+            <a:fillRect/>
+          </a:stretch>
+        </p:blipFill>
+        <p:spPr>
+          <a:xfrm>
+            <a:off x="5045006" y="6356057"/>
+            <a:ext cx="6409575" cy="363174"/>
+          </a:xfrm>
+          <a:prstGeom prst="rect">
+            <a:avLst/>
+          </a:prstGeom>
+        </p:spPr>
+      </p:pic>
+      <p:sp>
+        <p:nvSpPr>
+          <p:cNvPr id="84" name="Marcador de número de diapositiva 83">
+            <a:extLst>
+              <a:ext uri="{FF2B5EF4-FFF2-40B4-BE49-F238E27FC236}">
+                <a16:creationId xmlns:a16="http://schemas.microsoft.com/office/drawing/2014/main" id="{8AFC1A94-45E6-31C6-9BFE-D4E98E0BABEA}"/>
+              </a:ext>
+            </a:extLst>
+          </p:cNvPr>
+          <p:cNvSpPr>
+            <a:spLocks noGrp="1"/>
+          </p:cNvSpPr>
+          <p:nvPr>
+            <p:ph type="sldNum" sz="quarter" idx="7"/>
+          </p:nvPr>
+        </p:nvSpPr>
+        <p:spPr/>
+        <p:txBody>
+          <a:bodyPr/>
+          <a:lstStyle/>
+          <a:p>
+            <a:fld id="{B6F15528-21DE-4FAA-801E-634DDDAF4B2B}" type="slidenum">
+              <a:rPr lang="es-ES" smtClean="0"/>
+              <a:t>16</a:t>
+            </a:fld>
+            <a:endParaRPr lang="es-ES"/>
+          </a:p>
+        </p:txBody>
+      </p:sp>
+      <p:sp>
+        <p:nvSpPr>
+          <p:cNvPr id="3" name="Marcador de pie de página 2">
+            <a:extLst>
+              <a:ext uri="{FF2B5EF4-FFF2-40B4-BE49-F238E27FC236}">
+                <a16:creationId xmlns:a16="http://schemas.microsoft.com/office/drawing/2014/main" id="{C0BE0B43-EDD5-4E37-5634-C1C70538F9DB}"/>
+              </a:ext>
+            </a:extLst>
+          </p:cNvPr>
+          <p:cNvSpPr>
+            <a:spLocks noGrp="1"/>
+          </p:cNvSpPr>
+          <p:nvPr>
+            <p:ph type="ftr" sz="quarter" idx="5"/>
+          </p:nvPr>
+        </p:nvSpPr>
+        <p:spPr/>
+        <p:txBody>
+          <a:bodyPr/>
+          <a:lstStyle/>
+          <a:p>
+            <a:pPr marL="12700">
+              <a:spcBef>
+                <a:spcPts val="15"/>
+              </a:spcBef>
+            </a:pPr>
+            <a:r>
+              <a:rPr lang="es-ES" spc="-5"/>
+              <a:t>LAB 1.0. WAVEGUIDES</a:t>
+            </a:r>
+            <a:endParaRPr lang="es-ES" spc="-5" dirty="0"/>
+          </a:p>
+        </p:txBody>
+      </p:sp>
+      <p:sp>
+        <p:nvSpPr>
+          <p:cNvPr id="2" name="CuadroTexto 1">
+            <a:extLst>
+              <a:ext uri="{FF2B5EF4-FFF2-40B4-BE49-F238E27FC236}">
+                <a16:creationId xmlns:a16="http://schemas.microsoft.com/office/drawing/2014/main" id="{E773404B-53DA-562B-36EF-1505710DA9B7}"/>
+              </a:ext>
+            </a:extLst>
+          </p:cNvPr>
+          <p:cNvSpPr txBox="1"/>
+          <p:nvPr/>
+        </p:nvSpPr>
+        <p:spPr>
+          <a:xfrm>
+            <a:off x="609441" y="4860334"/>
+            <a:ext cx="11199971" cy="1200329"/>
+          </a:xfrm>
+          <a:prstGeom prst="rect">
+            <a:avLst/>
+          </a:prstGeom>
+          <a:solidFill>
+            <a:schemeClr val="bg1">
+              <a:lumMod val="95000"/>
+            </a:schemeClr>
+          </a:solidFill>
+          <a:ln w="28575">
+            <a:solidFill>
+              <a:srgbClr val="E0700D"/>
+            </a:solidFill>
+          </a:ln>
+        </p:spPr>
+        <p:txBody>
+          <a:bodyPr wrap="square" rtlCol="0">
+            <a:spAutoFit/>
+          </a:bodyPr>
+          <a:lstStyle/>
+          <a:p>
+            <a:pPr algn="just"/>
+            <a:r>
+              <a:rPr lang="en-US" sz="1200" dirty="0">
+                <a:latin typeface="Arial" panose="020B0604020202020204" pitchFamily="34" charset="0"/>
+                <a:cs typeface="Arial" panose="020B0604020202020204" pitchFamily="34" charset="0"/>
+              </a:rPr>
+              <a:t>Comment results, which is the safe radius, consider safe means less than 0.1 dB/90º.</a:t>
+            </a:r>
+          </a:p>
+          <a:p>
+            <a:pPr algn="just"/>
+            <a:endParaRPr lang="en-US" sz="1200" u="sng" dirty="0">
+              <a:latin typeface="Arial" panose="020B0604020202020204" pitchFamily="34" charset="0"/>
+              <a:cs typeface="Arial" panose="020B0604020202020204" pitchFamily="34" charset="0"/>
+            </a:endParaRPr>
+          </a:p>
+          <a:p>
+            <a:pPr algn="just"/>
+            <a:endParaRPr lang="en-US" sz="1200" dirty="0">
+              <a:latin typeface="Arial" panose="020B0604020202020204" pitchFamily="34" charset="0"/>
+              <a:cs typeface="Arial" panose="020B0604020202020204" pitchFamily="34" charset="0"/>
+            </a:endParaRPr>
+          </a:p>
+          <a:p>
+            <a:pPr algn="just"/>
+            <a:endParaRPr lang="en-US" sz="1200" dirty="0">
+              <a:latin typeface="Arial" panose="020B0604020202020204" pitchFamily="34" charset="0"/>
+              <a:cs typeface="Arial" panose="020B0604020202020204" pitchFamily="34" charset="0"/>
+            </a:endParaRPr>
+          </a:p>
+          <a:p>
+            <a:pPr algn="just"/>
+            <a:endParaRPr lang="en-US" sz="1200" dirty="0">
+              <a:latin typeface="Arial" panose="020B0604020202020204" pitchFamily="34" charset="0"/>
+              <a:cs typeface="Arial" panose="020B0604020202020204" pitchFamily="34" charset="0"/>
+            </a:endParaRPr>
+          </a:p>
+          <a:p>
+            <a:pPr algn="just"/>
+            <a:endParaRPr lang="en-US" sz="1200" dirty="0">
+              <a:latin typeface="Arial" panose="020B0604020202020204" pitchFamily="34" charset="0"/>
+              <a:cs typeface="Arial" panose="020B0604020202020204" pitchFamily="34" charset="0"/>
+            </a:endParaRPr>
+          </a:p>
+        </p:txBody>
+      </p:sp>
+      <mc:AlternateContent xmlns:mc="http://schemas.openxmlformats.org/markup-compatibility/2006">
+        <mc:Choice xmlns:a14="http://schemas.microsoft.com/office/drawing/2010/main" Requires="a14">
+          <p:sp>
+            <p:nvSpPr>
+              <p:cNvPr id="6" name="CuadroTexto 5">
+                <a:extLst>
+                  <a:ext uri="{FF2B5EF4-FFF2-40B4-BE49-F238E27FC236}">
+                    <a16:creationId xmlns:a16="http://schemas.microsoft.com/office/drawing/2014/main" id="{47B563D6-1B07-54C7-F3F3-F7AF0B20FF63}"/>
+                  </a:ext>
+                </a:extLst>
+              </p:cNvPr>
+              <p:cNvSpPr txBox="1"/>
+              <p:nvPr/>
+            </p:nvSpPr>
+            <p:spPr>
+              <a:xfrm>
+                <a:off x="10377883" y="3848100"/>
+                <a:ext cx="1856534" cy="439608"/>
+              </a:xfrm>
+              <a:prstGeom prst="rect">
+                <a:avLst/>
+              </a:prstGeom>
+              <a:noFill/>
+            </p:spPr>
+            <p:txBody>
+              <a:bodyPr wrap="none" lIns="0" tIns="0" rIns="0" bIns="0" rtlCol="0">
+                <a:spAutoFit/>
+              </a:bodyPr>
+              <a:lstStyle/>
+              <a:p>
+                <a14:m>
+                  <m:oMath xmlns:m="http://schemas.openxmlformats.org/officeDocument/2006/math">
+                    <m:r>
+                      <a:rPr lang="es-ES" sz="1800" b="0" i="1" smtClean="0">
+                        <a:latin typeface="Cambria Math" panose="02040503050406030204" pitchFamily="18" charset="0"/>
+                      </a:rPr>
+                      <m:t>𝛼</m:t>
+                    </m:r>
+                    <m:d>
+                      <m:dPr>
+                        <m:begChr m:val="["/>
+                        <m:endChr m:val="]"/>
+                        <m:ctrlPr>
+                          <a:rPr lang="es-ES" sz="1800" b="0" i="1" smtClean="0">
+                            <a:latin typeface="Cambria Math" panose="02040503050406030204" pitchFamily="18" charset="0"/>
+                          </a:rPr>
+                        </m:ctrlPr>
+                      </m:dPr>
+                      <m:e>
+                        <m:f>
+                          <m:fPr>
+                            <m:ctrlPr>
+                              <a:rPr lang="es-ES" sz="1800" b="0" i="1" smtClean="0">
+                                <a:latin typeface="Cambria Math" panose="02040503050406030204" pitchFamily="18" charset="0"/>
+                              </a:rPr>
+                            </m:ctrlPr>
+                          </m:fPr>
+                          <m:num>
+                            <m:r>
+                              <a:rPr lang="es-ES" sz="1800" b="0" i="1" smtClean="0">
+                                <a:latin typeface="Cambria Math" panose="02040503050406030204" pitchFamily="18" charset="0"/>
+                              </a:rPr>
+                              <m:t>𝑑𝐵</m:t>
+                            </m:r>
+                          </m:num>
+                          <m:den>
+                            <m:r>
+                              <a:rPr lang="es-ES" sz="1800" b="0" i="1" smtClean="0">
+                                <a:latin typeface="Cambria Math" panose="02040503050406030204" pitchFamily="18" charset="0"/>
+                              </a:rPr>
+                              <m:t>90</m:t>
+                            </m:r>
+                            <m:r>
+                              <a:rPr lang="es-ES" sz="1800" b="0" i="1" smtClean="0">
+                                <a:latin typeface="Cambria Math" panose="02040503050406030204" pitchFamily="18" charset="0"/>
+                                <a:ea typeface="Cambria Math" panose="02040503050406030204" pitchFamily="18" charset="0"/>
+                              </a:rPr>
+                              <m:t>°</m:t>
+                            </m:r>
+                          </m:den>
+                        </m:f>
+                      </m:e>
+                    </m:d>
+                    <m:r>
+                      <a:rPr lang="es-ES" sz="1800" b="0" i="1" smtClean="0">
+                        <a:latin typeface="Cambria Math" panose="02040503050406030204" pitchFamily="18" charset="0"/>
+                      </a:rPr>
+                      <m:t>=</m:t>
+                    </m:r>
+                  </m:oMath>
+                </a14:m>
+                <a:r>
+                  <a:rPr lang="es-ES" sz="1800" dirty="0"/>
+                  <a:t> </a:t>
+                </a:r>
+                <a14:m>
+                  <m:oMath xmlns:m="http://schemas.openxmlformats.org/officeDocument/2006/math">
+                    <m:r>
+                      <m:rPr>
+                        <m:sty m:val="p"/>
+                      </m:rPr>
+                      <a:rPr lang="es-ES" sz="1800" b="0" i="0" smtClean="0">
+                        <a:latin typeface="Cambria Math" panose="02040503050406030204" pitchFamily="18" charset="0"/>
+                      </a:rPr>
+                      <m:t>R</m:t>
+                    </m:r>
+                    <m:f>
+                      <m:fPr>
+                        <m:ctrlPr>
+                          <a:rPr lang="es-ES" sz="1800" b="0" i="1" smtClean="0">
+                            <a:latin typeface="Cambria Math" panose="02040503050406030204" pitchFamily="18" charset="0"/>
+                          </a:rPr>
+                        </m:ctrlPr>
+                      </m:fPr>
+                      <m:num>
+                        <m:r>
+                          <a:rPr lang="es-ES" sz="1800" b="0" i="1" smtClean="0">
+                            <a:latin typeface="Cambria Math" panose="02040503050406030204" pitchFamily="18" charset="0"/>
+                          </a:rPr>
+                          <m:t>𝜋</m:t>
+                        </m:r>
+                      </m:num>
+                      <m:den>
+                        <m:r>
+                          <a:rPr lang="es-ES" sz="1800" b="0" i="1" smtClean="0">
+                            <a:latin typeface="Cambria Math" panose="02040503050406030204" pitchFamily="18" charset="0"/>
+                          </a:rPr>
+                          <m:t>2</m:t>
+                        </m:r>
+                      </m:den>
+                    </m:f>
+                    <m:r>
+                      <a:rPr lang="es-ES" sz="1800" i="1">
+                        <a:latin typeface="Cambria Math" panose="02040503050406030204" pitchFamily="18" charset="0"/>
+                      </a:rPr>
+                      <m:t>𝛼</m:t>
+                    </m:r>
+                    <m:d>
+                      <m:dPr>
+                        <m:begChr m:val="["/>
+                        <m:endChr m:val="]"/>
+                        <m:ctrlPr>
+                          <a:rPr lang="es-ES" sz="1800" i="1">
+                            <a:latin typeface="Cambria Math" panose="02040503050406030204" pitchFamily="18" charset="0"/>
+                          </a:rPr>
+                        </m:ctrlPr>
+                      </m:dPr>
+                      <m:e>
+                        <m:f>
+                          <m:fPr>
+                            <m:ctrlPr>
+                              <a:rPr lang="es-ES" sz="1800" i="1">
+                                <a:latin typeface="Cambria Math" panose="02040503050406030204" pitchFamily="18" charset="0"/>
+                              </a:rPr>
+                            </m:ctrlPr>
+                          </m:fPr>
+                          <m:num>
+                            <m:r>
+                              <a:rPr lang="es-ES" sz="1800" i="1">
+                                <a:latin typeface="Cambria Math" panose="02040503050406030204" pitchFamily="18" charset="0"/>
+                              </a:rPr>
+                              <m:t>𝑑𝐵</m:t>
+                            </m:r>
+                          </m:num>
+                          <m:den>
+                            <m:r>
+                              <a:rPr lang="es-ES" sz="1800" i="1">
+                                <a:latin typeface="Cambria Math" panose="02040503050406030204" pitchFamily="18" charset="0"/>
+                              </a:rPr>
+                              <m:t>µ</m:t>
+                            </m:r>
+                            <m:r>
+                              <a:rPr lang="es-ES" sz="1800" i="1">
+                                <a:latin typeface="Cambria Math" panose="02040503050406030204" pitchFamily="18" charset="0"/>
+                              </a:rPr>
+                              <m:t>𝑚</m:t>
+                            </m:r>
+                          </m:den>
+                        </m:f>
+                      </m:e>
+                    </m:d>
+                  </m:oMath>
+                </a14:m>
+                <a:endParaRPr lang="en-US" sz="1800" dirty="0"/>
+              </a:p>
+            </p:txBody>
+          </p:sp>
+        </mc:Choice>
+        <mc:Fallback>
+          <p:sp>
+            <p:nvSpPr>
+              <p:cNvPr id="6" name="CuadroTexto 5">
+                <a:extLst>
+                  <a:ext uri="{FF2B5EF4-FFF2-40B4-BE49-F238E27FC236}">
+                    <a16:creationId xmlns:a16="http://schemas.microsoft.com/office/drawing/2014/main" id="{47B563D6-1B07-54C7-F3F3-F7AF0B20FF63}"/>
+                  </a:ext>
+                </a:extLst>
+              </p:cNvPr>
+              <p:cNvSpPr txBox="1">
+                <a:spLocks noRot="1" noChangeAspect="1" noMove="1" noResize="1" noEditPoints="1" noAdjustHandles="1" noChangeArrowheads="1" noChangeShapeType="1" noTextEdit="1"/>
+              </p:cNvSpPr>
+              <p:nvPr/>
+            </p:nvSpPr>
+            <p:spPr>
+              <a:xfrm>
+                <a:off x="10377883" y="3848100"/>
+                <a:ext cx="1856534" cy="439608"/>
+              </a:xfrm>
+              <a:prstGeom prst="rect">
+                <a:avLst/>
+              </a:prstGeom>
+              <a:blipFill>
+                <a:blip r:embed="rId5"/>
+                <a:stretch>
+                  <a:fillRect l="-3279" b="-13889"/>
+                </a:stretch>
+              </a:blipFill>
+            </p:spPr>
+            <p:txBody>
+              <a:bodyPr/>
+              <a:lstStyle/>
+              <a:p>
+                <a:r>
+                  <a:rPr lang="es-ES">
+                    <a:noFill/>
+                  </a:rPr>
+                  <a:t> </a:t>
+                </a:r>
+              </a:p>
+            </p:txBody>
+          </p:sp>
+        </mc:Fallback>
+      </mc:AlternateContent>
+      <p:pic>
+        <p:nvPicPr>
+          <p:cNvPr id="5" name="Imagen 4" descr="Gráfico&#10;&#10;El contenido generado por IA puede ser incorrecto.">
+            <a:extLst>
+              <a:ext uri="{FF2B5EF4-FFF2-40B4-BE49-F238E27FC236}">
+                <a16:creationId xmlns:a16="http://schemas.microsoft.com/office/drawing/2014/main" id="{0C74F35B-D191-A462-AD7B-124F13DE9A1A}"/>
+              </a:ext>
+            </a:extLst>
+          </p:cNvPr>
+          <p:cNvPicPr>
+            <a:picLocks noChangeAspect="1"/>
+          </p:cNvPicPr>
+          <p:nvPr/>
+        </p:nvPicPr>
+        <p:blipFill>
+          <a:blip r:embed="rId6"/>
+          <a:stretch>
+            <a:fillRect/>
+          </a:stretch>
+        </p:blipFill>
+        <p:spPr>
+          <a:xfrm>
+            <a:off x="933847" y="1148427"/>
+            <a:ext cx="4837906" cy="3505200"/>
+          </a:xfrm>
+          <a:prstGeom prst="rect">
+            <a:avLst/>
+          </a:prstGeom>
+        </p:spPr>
+      </p:pic>
+      <p:pic>
+        <p:nvPicPr>
+          <p:cNvPr id="10" name="Imagen 9" descr="Gráfico&#10;&#10;El contenido generado por IA puede ser incorrecto.">
+            <a:extLst>
+              <a:ext uri="{FF2B5EF4-FFF2-40B4-BE49-F238E27FC236}">
+                <a16:creationId xmlns:a16="http://schemas.microsoft.com/office/drawing/2014/main" id="{9095F3D9-170F-6EF9-D214-12DF46EACC62}"/>
+              </a:ext>
+            </a:extLst>
+          </p:cNvPr>
+          <p:cNvPicPr>
+            <a:picLocks noChangeAspect="1"/>
+          </p:cNvPicPr>
+          <p:nvPr/>
+        </p:nvPicPr>
+        <p:blipFill>
+          <a:blip r:embed="rId7"/>
+          <a:stretch>
+            <a:fillRect/>
+          </a:stretch>
+        </p:blipFill>
+        <p:spPr>
+          <a:xfrm>
+            <a:off x="5856030" y="1202722"/>
+            <a:ext cx="4507170" cy="3353055"/>
+          </a:xfrm>
+          <a:prstGeom prst="rect">
+            <a:avLst/>
+          </a:prstGeom>
+        </p:spPr>
+      </p:pic>
+    </p:spTree>
+    <p:extLst>
+      <p:ext uri="{BB962C8B-B14F-4D97-AF65-F5344CB8AC3E}">
+        <p14:creationId xmlns:p14="http://schemas.microsoft.com/office/powerpoint/2010/main" val="450816387"/>
+      </p:ext>
+    </p:extLst>
+  </p:cSld>
+  <p:clrMapOvr>
+    <a:masterClrMapping/>
+  </p:clrMapOvr>
+</p:sld>
+</file>
+
+<file path=ppt/slides/slide17.xml><?xml version="1.0" encoding="utf-8"?>
+<p:sld xmlns:a="http://schemas.openxmlformats.org/drawingml/2006/main" xmlns:r="http://schemas.openxmlformats.org/officeDocument/2006/relationships" xmlns:p="http://schemas.openxmlformats.org/presentationml/2006/main">
+  <p:cSld>
+    <p:spTree>
+      <p:nvGrpSpPr>
         <p:cNvPr id="1" name=""/>
         <p:cNvGrpSpPr/>
         <p:nvPr/>
@@ -10474,7 +11162,7 @@
           <a:p>
             <a:fld id="{B6F15528-21DE-4FAA-801E-634DDDAF4B2B}" type="slidenum">
               <a:rPr lang="es-ES" smtClean="0"/>
-              <a:t>16</a:t>
+              <a:t>17</a:t>
             </a:fld>
             <a:endParaRPr lang="es-ES"/>
           </a:p>

</xml_diff>